<commit_message>
Added the ModelBinder person creation/retrieval demo.
</commit_message>
<xml_diff>
--- a/slides/lozano_aspnetconnections_AMV305_Oh_ASPNET_MVC_How_Extensible_Art_Thou.pptx
+++ b/slides/lozano_aspnetconnections_AMV305_Oh_ASPNET_MVC_How_Extensible_Art_Thou.pptx
@@ -5,10 +5,10 @@
     <p:sldMasterId id="2147483648" r:id="rId1"/>
   </p:sldMasterIdLst>
   <p:notesMasterIdLst>
-    <p:notesMasterId r:id="rId8"/>
+    <p:notesMasterId r:id="rId9"/>
   </p:notesMasterIdLst>
   <p:handoutMasterIdLst>
-    <p:handoutMasterId r:id="rId9"/>
+    <p:handoutMasterId r:id="rId10"/>
   </p:handoutMasterIdLst>
   <p:sldIdLst>
     <p:sldId id="263" r:id="rId2"/>
@@ -16,7 +16,8 @@
     <p:sldId id="260" r:id="rId4"/>
     <p:sldId id="261" r:id="rId5"/>
     <p:sldId id="262" r:id="rId6"/>
-    <p:sldId id="258" r:id="rId7"/>
+    <p:sldId id="264" r:id="rId7"/>
+    <p:sldId id="258" r:id="rId8"/>
   </p:sldIdLst>
   <p:sldSz cx="9144000" cy="6858000" type="screen4x3"/>
   <p:notesSz cx="6858000" cy="9144000"/>
@@ -332,7 +333,7 @@
     </p:spTree>
     <p:extLst>
       <p:ext uri="{BB962C8B-B14F-4D97-AF65-F5344CB8AC3E}">
-        <p14:creationId xmlns:p14="http://schemas.microsoft.com/office/powerpoint/2010/main" val="2866583927"/>
+        <p14:creationId xmlns:p14="http://schemas.microsoft.com/office/powerpoint/2010/main" xmlns="" val="2866583927"/>
       </p:ext>
     </p:extLst>
   </p:cSld>
@@ -675,7 +676,7 @@
     </p:spTree>
     <p:extLst>
       <p:ext uri="{BB962C8B-B14F-4D97-AF65-F5344CB8AC3E}">
-        <p14:creationId xmlns:p14="http://schemas.microsoft.com/office/powerpoint/2010/main" val="538118204"/>
+        <p14:creationId xmlns:p14="http://schemas.microsoft.com/office/powerpoint/2010/main" xmlns="" val="538118204"/>
       </p:ext>
     </p:extLst>
   </p:cSld>
@@ -1253,9 +1254,91 @@
       </p:grpSpPr>
       <p:sp>
         <p:nvSpPr>
-          <p:cNvPr id="8194" name="Slide Image Placeholder 1"/>
-          <p:cNvSpPr>
-            <a:spLocks noGrp="1" noRot="1" noChangeAspect="1" noTextEdit="1"/>
+          <p:cNvPr id="60418" name="Rectangle 2"/>
+          <p:cNvSpPr>
+            <a:spLocks noGrp="1" noChangeArrowheads="1"/>
+          </p:cNvSpPr>
+          <p:nvPr>
+            <p:ph type="hdr" sz="quarter"/>
+          </p:nvPr>
+        </p:nvSpPr>
+        <p:spPr>
+          <a:noFill/>
+        </p:spPr>
+        <p:txBody>
+          <a:bodyPr/>
+          <a:lstStyle/>
+          <a:p>
+            <a:r>
+              <a:rPr lang="en-US" smtClean="0"/>
+              <a:t>MGB 2003</a:t>
+            </a:r>
+          </a:p>
+        </p:txBody>
+      </p:sp>
+      <p:sp>
+        <p:nvSpPr>
+          <p:cNvPr id="60419" name="Rectangle 6"/>
+          <p:cNvSpPr>
+            <a:spLocks noGrp="1" noChangeArrowheads="1"/>
+          </p:cNvSpPr>
+          <p:nvPr>
+            <p:ph type="ftr" sz="quarter" idx="4"/>
+          </p:nvPr>
+        </p:nvSpPr>
+        <p:spPr>
+          <a:noFill/>
+        </p:spPr>
+        <p:txBody>
+          <a:bodyPr/>
+          <a:lstStyle/>
+          <a:p>
+            <a:r>
+              <a:rPr lang="en-US" smtClean="0"/>
+              <a:t>© 2003 Microsoft Corporation. All rights reserved.</a:t>
+            </a:r>
+          </a:p>
+          <a:p>
+            <a:pPr eaLnBrk="0" hangingPunct="0"/>
+            <a:r>
+              <a:rPr lang="en-US" smtClean="0"/>
+              <a:t>This presentation is for informational purposes only. Microsoft makes no warranties, express or implied, in this summary.</a:t>
+            </a:r>
+            <a:endParaRPr lang="en-US" sz="1200" smtClean="0"/>
+          </a:p>
+        </p:txBody>
+      </p:sp>
+      <p:sp>
+        <p:nvSpPr>
+          <p:cNvPr id="60420" name="Rectangle 7"/>
+          <p:cNvSpPr>
+            <a:spLocks noGrp="1" noChangeArrowheads="1"/>
+          </p:cNvSpPr>
+          <p:nvPr>
+            <p:ph type="sldNum" sz="quarter" idx="5"/>
+          </p:nvPr>
+        </p:nvSpPr>
+        <p:spPr>
+          <a:noFill/>
+        </p:spPr>
+        <p:txBody>
+          <a:bodyPr/>
+          <a:lstStyle/>
+          <a:p>
+            <a:fld id="{F261F505-AED0-4688-8DF0-CD479DFAEA66}" type="slidenum">
+              <a:rPr lang="en-US" smtClean="0"/>
+              <a:pPr/>
+              <a:t>6</a:t>
+            </a:fld>
+            <a:endParaRPr lang="en-US" smtClean="0"/>
+          </a:p>
+        </p:txBody>
+      </p:sp>
+      <p:sp>
+        <p:nvSpPr>
+          <p:cNvPr id="60421" name="Rectangle 2"/>
+          <p:cNvSpPr>
+            <a:spLocks noGrp="1" noRot="1" noChangeAspect="1" noChangeArrowheads="1" noTextEdit="1"/>
           </p:cNvSpPr>
           <p:nvPr>
             <p:ph type="sldImg"/>
@@ -1267,9 +1350,9 @@
       </p:sp>
       <p:sp>
         <p:nvSpPr>
-          <p:cNvPr id="8195" name="Notes Placeholder 2"/>
-          <p:cNvSpPr>
-            <a:spLocks noGrp="1"/>
+          <p:cNvPr id="60422" name="Rectangle 3"/>
+          <p:cNvSpPr>
+            <a:spLocks noGrp="1" noChangeArrowheads="1"/>
           </p:cNvSpPr>
           <p:nvPr>
             <p:ph type="body" idx="1"/>
@@ -1283,42 +1366,80 @@
           <a:bodyPr/>
           <a:lstStyle/>
           <a:p>
+            <a:pPr eaLnBrk="1" hangingPunct="1"/>
             <a:endParaRPr lang="en-US" smtClean="0"/>
           </a:p>
         </p:txBody>
       </p:sp>
-      <p:sp>
-        <p:nvSpPr>
-          <p:cNvPr id="8196" name="Header Placeholder 3"/>
+    </p:spTree>
+  </p:cSld>
+  <p:clrMapOvr>
+    <a:masterClrMapping/>
+  </p:clrMapOvr>
+</p:notes>
+</file>
+
+<file path=ppt/notesSlides/notesSlide5.xml><?xml version="1.0" encoding="utf-8"?>
+<p:notes xmlns:a="http://schemas.openxmlformats.org/drawingml/2006/main" xmlns:r="http://schemas.openxmlformats.org/officeDocument/2006/relationships" xmlns:p="http://schemas.openxmlformats.org/presentationml/2006/main">
+  <p:cSld>
+    <p:spTree>
+      <p:nvGrpSpPr>
+        <p:cNvPr id="1" name=""/>
+        <p:cNvGrpSpPr/>
+        <p:nvPr/>
+      </p:nvGrpSpPr>
+      <p:grpSpPr>
+        <a:xfrm>
+          <a:off x="0" y="0"/>
+          <a:ext cx="0" cy="0"/>
+          <a:chOff x="0" y="0"/>
+          <a:chExt cx="0" cy="0"/>
+        </a:xfrm>
+      </p:grpSpPr>
+      <p:sp>
+        <p:nvSpPr>
+          <p:cNvPr id="8194" name="Slide Image Placeholder 1"/>
+          <p:cNvSpPr>
+            <a:spLocks noGrp="1" noRot="1" noChangeAspect="1" noTextEdit="1"/>
+          </p:cNvSpPr>
+          <p:nvPr>
+            <p:ph type="sldImg"/>
+          </p:nvPr>
+        </p:nvSpPr>
+        <p:spPr>
+          <a:ln/>
+        </p:spPr>
+      </p:sp>
+      <p:sp>
+        <p:nvSpPr>
+          <p:cNvPr id="8195" name="Notes Placeholder 2"/>
           <p:cNvSpPr>
             <a:spLocks noGrp="1"/>
           </p:cNvSpPr>
           <p:nvPr>
-            <p:ph type="hdr" sz="quarter"/>
+            <p:ph type="body" idx="1"/>
           </p:nvPr>
         </p:nvSpPr>
         <p:spPr>
           <a:noFill/>
+          <a:ln/>
         </p:spPr>
         <p:txBody>
           <a:bodyPr/>
           <a:lstStyle/>
           <a:p>
-            <a:r>
-              <a:rPr lang="en-US" smtClean="0"/>
-              <a:t>Visual Studio Connections</a:t>
-            </a:r>
-          </a:p>
-        </p:txBody>
-      </p:sp>
-      <p:sp>
-        <p:nvSpPr>
-          <p:cNvPr id="8197" name="Footer Placeholder 4"/>
+            <a:endParaRPr lang="en-US" smtClean="0"/>
+          </a:p>
+        </p:txBody>
+      </p:sp>
+      <p:sp>
+        <p:nvSpPr>
+          <p:cNvPr id="8196" name="Header Placeholder 3"/>
           <p:cNvSpPr>
             <a:spLocks noGrp="1"/>
           </p:cNvSpPr>
           <p:nvPr>
-            <p:ph type="ftr" sz="quarter" idx="4"/>
+            <p:ph type="hdr" sz="quarter"/>
           </p:nvPr>
         </p:nvSpPr>
         <p:spPr>
@@ -1329,6 +1450,30 @@
           <a:lstStyle/>
           <a:p>
             <a:r>
+              <a:rPr lang="en-US" smtClean="0"/>
+              <a:t>Visual Studio Connections</a:t>
+            </a:r>
+          </a:p>
+        </p:txBody>
+      </p:sp>
+      <p:sp>
+        <p:nvSpPr>
+          <p:cNvPr id="8197" name="Footer Placeholder 4"/>
+          <p:cNvSpPr>
+            <a:spLocks noGrp="1"/>
+          </p:cNvSpPr>
+          <p:nvPr>
+            <p:ph type="ftr" sz="quarter" idx="4"/>
+          </p:nvPr>
+        </p:nvSpPr>
+        <p:spPr>
+          <a:noFill/>
+        </p:spPr>
+        <p:txBody>
+          <a:bodyPr/>
+          <a:lstStyle/>
+          <a:p>
+            <a:r>
               <a:rPr lang="en-US"/>
               <a:t>Updates will be available at http://www.devconnections.com/updates/LasVegas_Fall08/VS</a:t>
             </a:r>
@@ -1355,7 +1500,7 @@
             <a:fld id="{676EAB40-3BED-4879-909B-D791B02DA3CD}" type="slidenum">
               <a:rPr lang="en-US" smtClean="0"/>
               <a:pPr/>
-              <a:t>6</a:t>
+              <a:t>7</a:t>
             </a:fld>
             <a:endParaRPr lang="en-US" smtClean="0"/>
           </a:p>
@@ -2132,7 +2277,7 @@
     </p:spTree>
     <p:extLst>
       <p:ext uri="{BB962C8B-B14F-4D97-AF65-F5344CB8AC3E}">
-        <p14:creationId xmlns:p14="http://schemas.microsoft.com/office/powerpoint/2010/main" val="659010935"/>
+        <p14:creationId xmlns:p14="http://schemas.microsoft.com/office/powerpoint/2010/main" xmlns="" val="659010935"/>
       </p:ext>
     </p:extLst>
   </p:cSld>
@@ -4932,7 +5077,7 @@
     </p:spTree>
     <p:extLst>
       <p:ext uri="{BB962C8B-B14F-4D97-AF65-F5344CB8AC3E}">
-        <p14:creationId xmlns:p14="http://schemas.microsoft.com/office/powerpoint/2010/main" val="716981822"/>
+        <p14:creationId xmlns:p14="http://schemas.microsoft.com/office/powerpoint/2010/main" xmlns="" val="716981822"/>
       </p:ext>
     </p:extLst>
   </p:cSld>
@@ -5208,8 +5353,9 @@
             </a:pPr>
             <a:r>
               <a:rPr lang="en-US" sz="2400" dirty="0" smtClean="0"/>
-              <a:t>Controller Actions</a:t>
-            </a:r>
+              <a:t>Filters</a:t>
+            </a:r>
+            <a:endParaRPr lang="en-US" sz="2400" dirty="0" smtClean="0"/>
           </a:p>
           <a:p>
             <a:pPr>
@@ -5219,27 +5365,19 @@
             </a:pPr>
             <a:r>
               <a:rPr lang="en-US" sz="2400" dirty="0" smtClean="0"/>
-              <a:t>View Engines</a:t>
-            </a:r>
-          </a:p>
-          <a:p>
-            <a:pPr>
-              <a:lnSpc>
-                <a:spcPct val="90000"/>
-              </a:lnSpc>
-            </a:pPr>
+              <a:t>Model </a:t>
+            </a:r>
             <a:r>
               <a:rPr lang="en-US" sz="2400" dirty="0" smtClean="0"/>
-              <a:t>Model Binder</a:t>
-            </a:r>
-            <a:endParaRPr lang="en-US" sz="2400" dirty="0" smtClean="0"/>
+              <a:t>Binder</a:t>
+            </a:r>
           </a:p>
         </p:txBody>
       </p:sp>
     </p:spTree>
     <p:extLst>
       <p:ext uri="{BB962C8B-B14F-4D97-AF65-F5344CB8AC3E}">
-        <p14:creationId xmlns:p14="http://schemas.microsoft.com/office/powerpoint/2010/main" val="4063925338"/>
+        <p14:creationId xmlns:p14="http://schemas.microsoft.com/office/powerpoint/2010/main" xmlns="" val="4063925338"/>
       </p:ext>
     </p:extLst>
   </p:cSld>
@@ -5517,7 +5655,6 @@
               <a:rPr lang="en-US" sz="2400" dirty="0" smtClean="0"/>
               <a:t>Provide quick reference and tips</a:t>
             </a:r>
-            <a:endParaRPr lang="en-US" sz="2400" dirty="0" smtClean="0"/>
           </a:p>
           <a:p>
             <a:pPr>
@@ -5532,7 +5669,7 @@
     </p:spTree>
     <p:extLst>
       <p:ext uri="{BB962C8B-B14F-4D97-AF65-F5344CB8AC3E}">
-        <p14:creationId xmlns:p14="http://schemas.microsoft.com/office/powerpoint/2010/main" val="4016957348"/>
+        <p14:creationId xmlns:p14="http://schemas.microsoft.com/office/powerpoint/2010/main" xmlns="" val="4016957348"/>
       </p:ext>
     </p:extLst>
   </p:cSld>
@@ -5613,6 +5750,10 @@
           </p:nvPr>
         </p:nvSpPr>
         <p:spPr bwMode="auto">
+          <a:xfrm>
+            <a:off x="887413" y="1576388"/>
+            <a:ext cx="3608387" cy="2081212"/>
+          </a:xfrm>
           <a:noFill/>
           <a:ln>
             <a:miter lim="800000"/>
@@ -5792,7 +5933,7 @@
     </p:spTree>
     <p:extLst>
       <p:ext uri="{BB962C8B-B14F-4D97-AF65-F5344CB8AC3E}">
-        <p14:creationId xmlns:p14="http://schemas.microsoft.com/office/powerpoint/2010/main" val="2648234986"/>
+        <p14:creationId xmlns:p14="http://schemas.microsoft.com/office/powerpoint/2010/main" xmlns="" val="2648234986"/>
       </p:ext>
     </p:extLst>
   </p:cSld>
@@ -5918,11 +6059,7 @@
             </a:r>
             <a:r>
               <a:rPr lang="en-US" sz="2400" smtClean="0"/>
-              <a:t>://</a:t>
-            </a:r>
-            <a:r>
-              <a:rPr lang="en-US" sz="2400" smtClean="0"/>
-              <a:t>github.com/lozanotek/mvctextensions</a:t>
+              <a:t>://github.com/lozanotek/mvctextensions</a:t>
             </a:r>
             <a:endParaRPr lang="en-US" sz="2400" dirty="0" smtClean="0"/>
           </a:p>
@@ -5931,7 +6068,7 @@
     </p:spTree>
     <p:extLst>
       <p:ext uri="{BB962C8B-B14F-4D97-AF65-F5344CB8AC3E}">
-        <p14:creationId xmlns:p14="http://schemas.microsoft.com/office/powerpoint/2010/main" val="3210184213"/>
+        <p14:creationId xmlns:p14="http://schemas.microsoft.com/office/powerpoint/2010/main" xmlns="" val="3210184213"/>
       </p:ext>
     </p:extLst>
   </p:cSld>
@@ -5950,6 +6087,123 @@
 </file>
 
 <file path=ppt/slides/slide6.xml><?xml version="1.0" encoding="utf-8"?>
+<p:sld xmlns:a="http://schemas.openxmlformats.org/drawingml/2006/main" xmlns:r="http://schemas.openxmlformats.org/officeDocument/2006/relationships" xmlns:p="http://schemas.openxmlformats.org/presentationml/2006/main">
+  <p:cSld>
+    <p:spTree>
+      <p:nvGrpSpPr>
+        <p:cNvPr id="1" name=""/>
+        <p:cNvGrpSpPr/>
+        <p:nvPr/>
+      </p:nvGrpSpPr>
+      <p:grpSpPr>
+        <a:xfrm>
+          <a:off x="0" y="0"/>
+          <a:ext cx="0" cy="0"/>
+          <a:chOff x="0" y="0"/>
+          <a:chExt cx="0" cy="0"/>
+        </a:xfrm>
+      </p:grpSpPr>
+      <p:sp>
+        <p:nvSpPr>
+          <p:cNvPr id="203778" name="Rectangle 2"/>
+          <p:cNvSpPr>
+            <a:spLocks noGrp="1" noChangeArrowheads="1"/>
+          </p:cNvSpPr>
+          <p:nvPr>
+            <p:ph type="title"/>
+          </p:nvPr>
+        </p:nvSpPr>
+        <p:spPr bwMode="auto">
+          <a:ln>
+            <a:noFill/>
+            <a:miter lim="800000"/>
+            <a:headEnd/>
+            <a:tailEnd/>
+          </a:ln>
+        </p:spPr>
+        <p:txBody>
+          <a:bodyPr vert="horz" wrap="square" lIns="91440" tIns="45720" rIns="91440" bIns="45720" numCol="1" anchor="t" anchorCtr="0" compatLnSpc="1">
+            <a:prstTxWarp prst="textNoShape">
+              <a:avLst/>
+            </a:prstTxWarp>
+          </a:bodyPr>
+          <a:lstStyle/>
+          <a:p>
+            <a:pPr algn="r">
+              <a:defRPr/>
+            </a:pPr>
+            <a:r>
+              <a:rPr lang="en-US" dirty="0" smtClean="0"/>
+              <a:t>Demo</a:t>
+            </a:r>
+            <a:endParaRPr lang="en-US" dirty="0" smtClean="0"/>
+          </a:p>
+        </p:txBody>
+      </p:sp>
+      <p:sp>
+        <p:nvSpPr>
+          <p:cNvPr id="29700" name="Text Placeholder 5"/>
+          <p:cNvSpPr>
+            <a:spLocks noGrp="1"/>
+          </p:cNvSpPr>
+          <p:nvPr>
+            <p:ph type="body" sz="half" idx="1"/>
+          </p:nvPr>
+        </p:nvSpPr>
+        <p:spPr bwMode="auto">
+          <a:xfrm>
+            <a:off x="2324101" y="2933701"/>
+            <a:ext cx="4495799" cy="990599"/>
+          </a:xfrm>
+          <a:noFill/>
+          <a:ln>
+            <a:miter lim="800000"/>
+            <a:headEnd/>
+            <a:tailEnd/>
+          </a:ln>
+        </p:spPr>
+        <p:txBody>
+          <a:bodyPr vert="horz" wrap="square" lIns="91440" tIns="45720" rIns="91440" bIns="45720" numCol="1" anchor="t" anchorCtr="0" compatLnSpc="1">
+            <a:prstTxWarp prst="textNoShape">
+              <a:avLst/>
+            </a:prstTxWarp>
+            <a:noAutofit/>
+          </a:bodyPr>
+          <a:lstStyle/>
+          <a:p>
+            <a:pPr algn="ctr">
+              <a:buNone/>
+            </a:pPr>
+            <a:r>
+              <a:rPr lang="en-US" sz="6000" dirty="0" smtClean="0"/>
+              <a:t>Let’s code!</a:t>
+            </a:r>
+            <a:endParaRPr lang="en-US" sz="6000" dirty="0" smtClean="0"/>
+          </a:p>
+        </p:txBody>
+      </p:sp>
+    </p:spTree>
+    <p:extLst>
+      <p:ext uri="{BB962C8B-B14F-4D97-AF65-F5344CB8AC3E}">
+        <p14:creationId xmlns:p14="http://schemas.microsoft.com/office/powerpoint/2010/main" xmlns="" val="3210184213"/>
+      </p:ext>
+    </p:extLst>
+  </p:cSld>
+  <p:clrMapOvr>
+    <a:masterClrMapping/>
+  </p:clrMapOvr>
+  <p:transition/>
+  <p:timing>
+    <p:tnLst>
+      <p:par>
+        <p:cTn id="1" dur="indefinite" restart="never" nodeType="tmRoot"/>
+      </p:par>
+    </p:tnLst>
+  </p:timing>
+</p:sld>
+</file>
+
+<file path=ppt/slides/slide7.xml><?xml version="1.0" encoding="utf-8"?>
 <p:sld xmlns:a="http://schemas.openxmlformats.org/drawingml/2006/main" xmlns:r="http://schemas.openxmlformats.org/officeDocument/2006/relationships" xmlns:p="http://schemas.openxmlformats.org/presentationml/2006/main">
   <p:cSld>
     <p:spTree>

</xml_diff>

<commit_message>
Changed the slides to include the MVC Turbine logo.
</commit_message>
<xml_diff>
--- a/slides/lozano_aspnetconnections_AMV305_Oh_ASPNET_MVC_How_Extensible_Art_Thou.pptx
+++ b/slides/lozano_aspnetconnections_AMV305_Oh_ASPNET_MVC_How_Extensible_Art_Thou.pptx
@@ -333,7 +333,7 @@
     </p:spTree>
     <p:extLst>
       <p:ext uri="{BB962C8B-B14F-4D97-AF65-F5344CB8AC3E}">
-        <p14:creationId xmlns:p14="http://schemas.microsoft.com/office/powerpoint/2010/main" xmlns="" val="2866583927"/>
+        <p14:creationId xmlns="" xmlns:p14="http://schemas.microsoft.com/office/powerpoint/2010/main" val="2866583927"/>
       </p:ext>
     </p:extLst>
   </p:cSld>
@@ -676,7 +676,7 @@
     </p:spTree>
     <p:extLst>
       <p:ext uri="{BB962C8B-B14F-4D97-AF65-F5344CB8AC3E}">
-        <p14:creationId xmlns:p14="http://schemas.microsoft.com/office/powerpoint/2010/main" xmlns="" val="538118204"/>
+        <p14:creationId xmlns="" xmlns:p14="http://schemas.microsoft.com/office/powerpoint/2010/main" val="538118204"/>
       </p:ext>
     </p:extLst>
   </p:cSld>
@@ -2277,7 +2277,7 @@
     </p:spTree>
     <p:extLst>
       <p:ext uri="{BB962C8B-B14F-4D97-AF65-F5344CB8AC3E}">
-        <p14:creationId xmlns:p14="http://schemas.microsoft.com/office/powerpoint/2010/main" xmlns="" val="659010935"/>
+        <p14:creationId xmlns="" xmlns:p14="http://schemas.microsoft.com/office/powerpoint/2010/main" val="659010935"/>
       </p:ext>
     </p:extLst>
   </p:cSld>
@@ -5077,7 +5077,7 @@
     </p:spTree>
     <p:extLst>
       <p:ext uri="{BB962C8B-B14F-4D97-AF65-F5344CB8AC3E}">
-        <p14:creationId xmlns:p14="http://schemas.microsoft.com/office/powerpoint/2010/main" xmlns="" val="716981822"/>
+        <p14:creationId xmlns="" xmlns:p14="http://schemas.microsoft.com/office/powerpoint/2010/main" val="716981822"/>
       </p:ext>
     </p:extLst>
   </p:cSld>
@@ -5355,7 +5355,6 @@
               <a:rPr lang="en-US" sz="2400" dirty="0" smtClean="0"/>
               <a:t>Filters</a:t>
             </a:r>
-            <a:endParaRPr lang="en-US" sz="2400" dirty="0" smtClean="0"/>
           </a:p>
           <a:p>
             <a:pPr>
@@ -5365,11 +5364,7 @@
             </a:pPr>
             <a:r>
               <a:rPr lang="en-US" sz="2400" dirty="0" smtClean="0"/>
-              <a:t>Model </a:t>
-            </a:r>
-            <a:r>
-              <a:rPr lang="en-US" sz="2400" dirty="0" smtClean="0"/>
-              <a:t>Binder</a:t>
+              <a:t>Model Binder</a:t>
             </a:r>
           </a:p>
         </p:txBody>
@@ -5377,7 +5372,7 @@
     </p:spTree>
     <p:extLst>
       <p:ext uri="{BB962C8B-B14F-4D97-AF65-F5344CB8AC3E}">
-        <p14:creationId xmlns:p14="http://schemas.microsoft.com/office/powerpoint/2010/main" xmlns="" val="4063925338"/>
+        <p14:creationId xmlns="" xmlns:p14="http://schemas.microsoft.com/office/powerpoint/2010/main" val="4063925338"/>
       </p:ext>
     </p:extLst>
   </p:cSld>
@@ -5669,7 +5664,7 @@
     </p:spTree>
     <p:extLst>
       <p:ext uri="{BB962C8B-B14F-4D97-AF65-F5344CB8AC3E}">
-        <p14:creationId xmlns:p14="http://schemas.microsoft.com/office/powerpoint/2010/main" xmlns="" val="4016957348"/>
+        <p14:creationId xmlns="" xmlns:p14="http://schemas.microsoft.com/office/powerpoint/2010/main" val="4016957348"/>
       </p:ext>
     </p:extLst>
   </p:cSld>
@@ -5830,6 +5825,18 @@
                 <a:spcPct val="90000"/>
               </a:lnSpc>
             </a:pPr>
+            <a:r>
+              <a:rPr lang="en-US" sz="2400" dirty="0" smtClean="0"/>
+              <a:t>MVC Turbine</a:t>
+            </a:r>
+            <a:endParaRPr lang="en-US" sz="2400" dirty="0" smtClean="0"/>
+          </a:p>
+          <a:p>
+            <a:pPr>
+              <a:lnSpc>
+                <a:spcPct val="90000"/>
+              </a:lnSpc>
+            </a:pPr>
             <a:endParaRPr lang="en-US" sz="2400" dirty="0" smtClean="0"/>
           </a:p>
         </p:txBody>
@@ -5930,10 +5937,34 @@
           </a:ln>
         </p:spPr>
       </p:pic>
+      <p:pic>
+        <p:nvPicPr>
+          <p:cNvPr id="7" name="Picture 6" descr="full-logo-large.png"/>
+          <p:cNvPicPr>
+            <a:picLocks noChangeAspect="1"/>
+          </p:cNvPicPr>
+          <p:nvPr/>
+        </p:nvPicPr>
+        <p:blipFill>
+          <a:blip r:embed="rId6" cstate="print"/>
+          <a:stretch>
+            <a:fillRect/>
+          </a:stretch>
+        </p:blipFill>
+        <p:spPr>
+          <a:xfrm>
+            <a:off x="5715000" y="4953000"/>
+            <a:ext cx="2848373" cy="943107"/>
+          </a:xfrm>
+          <a:prstGeom prst="rect">
+            <a:avLst/>
+          </a:prstGeom>
+        </p:spPr>
+      </p:pic>
     </p:spTree>
     <p:extLst>
       <p:ext uri="{BB962C8B-B14F-4D97-AF65-F5344CB8AC3E}">
-        <p14:creationId xmlns:p14="http://schemas.microsoft.com/office/powerpoint/2010/main" xmlns="" val="2648234986"/>
+        <p14:creationId xmlns="" xmlns:p14="http://schemas.microsoft.com/office/powerpoint/2010/main" val="2648234986"/>
       </p:ext>
     </p:extLst>
   </p:cSld>
@@ -6037,8 +6068,13 @@
           <a:p>
             <a:r>
               <a:rPr lang="en-US" sz="2400" dirty="0" smtClean="0"/>
-              <a:t>Email:   javier@lozanotek.com</a:t>
-            </a:r>
+              <a:t>Email:   </a:t>
+            </a:r>
+            <a:r>
+              <a:rPr lang="en-US" sz="2400" dirty="0" smtClean="0"/>
+              <a:t>javier@lozanotek.com</a:t>
+            </a:r>
+            <a:endParaRPr lang="en-US" sz="2400" dirty="0" smtClean="0"/>
           </a:p>
           <a:p>
             <a:r>
@@ -6055,11 +6091,11 @@
           <a:p>
             <a:r>
               <a:rPr lang="en-US" sz="2400" dirty="0" smtClean="0"/>
-              <a:t>Code:   http</a:t>
-            </a:r>
-            <a:r>
-              <a:rPr lang="en-US" sz="2400" smtClean="0"/>
-              <a:t>://github.com/lozanotek/mvctextensions</a:t>
+              <a:t>Code:   http://</a:t>
+            </a:r>
+            <a:r>
+              <a:rPr lang="en-US" sz="2400" dirty="0" smtClean="0"/>
+              <a:t>github.com/lozanotek/mvcextensions</a:t>
             </a:r>
             <a:endParaRPr lang="en-US" sz="2400" dirty="0" smtClean="0"/>
           </a:p>
@@ -6068,7 +6104,7 @@
     </p:spTree>
     <p:extLst>
       <p:ext uri="{BB962C8B-B14F-4D97-AF65-F5344CB8AC3E}">
-        <p14:creationId xmlns:p14="http://schemas.microsoft.com/office/powerpoint/2010/main" xmlns="" val="3210184213"/>
+        <p14:creationId xmlns="" xmlns:p14="http://schemas.microsoft.com/office/powerpoint/2010/main" val="3210184213"/>
       </p:ext>
     </p:extLst>
   </p:cSld>
@@ -6136,7 +6172,6 @@
               <a:rPr lang="en-US" dirty="0" smtClean="0"/>
               <a:t>Demo</a:t>
             </a:r>
-            <a:endParaRPr lang="en-US" dirty="0" smtClean="0"/>
           </a:p>
         </p:txBody>
       </p:sp>
@@ -6178,14 +6213,13 @@
               <a:rPr lang="en-US" sz="6000" dirty="0" smtClean="0"/>
               <a:t>Let’s code!</a:t>
             </a:r>
-            <a:endParaRPr lang="en-US" sz="6000" dirty="0" smtClean="0"/>
           </a:p>
         </p:txBody>
       </p:sp>
     </p:spTree>
     <p:extLst>
       <p:ext uri="{BB962C8B-B14F-4D97-AF65-F5344CB8AC3E}">
-        <p14:creationId xmlns:p14="http://schemas.microsoft.com/office/powerpoint/2010/main" xmlns="" val="3210184213"/>
+        <p14:creationId xmlns="" xmlns:p14="http://schemas.microsoft.com/office/powerpoint/2010/main" val="3210184213"/>
       </p:ext>
     </p:extLst>
   </p:cSld>

</xml_diff>